<commit_message>
Lab #2 slides, with updates and corrections
</commit_message>
<xml_diff>
--- a/cs447jb_rec2_jan26_and_29.pptx
+++ b/cs447jb_rec2_jan26_and_29.pptx
@@ -3489,6 +3489,13 @@
   <p:clrMapOvr>
     <a:masterClrMapping/>
   </p:clrMapOvr>
+  <p:timing>
+    <p:tnLst>
+      <p:par>
+        <p:cTn id="1" dur="indefinite" restart="never" nodeType="tmRoot"/>
+      </p:par>
+    </p:tnLst>
+  </p:timing>
 </p:sld>
 </file>
 
@@ -3695,6 +3702,13 @@
   <p:clrMapOvr>
     <a:masterClrMapping/>
   </p:clrMapOvr>
+  <p:timing>
+    <p:tnLst>
+      <p:par>
+        <p:cTn id="1" dur="indefinite" restart="never" nodeType="tmRoot"/>
+      </p:par>
+    </p:tnLst>
+  </p:timing>
 </p:sld>
 </file>
 
@@ -3820,6 +3834,13 @@
   <p:clrMapOvr>
     <a:masterClrMapping/>
   </p:clrMapOvr>
+  <p:timing>
+    <p:tnLst>
+      <p:par>
+        <p:cTn id="1" dur="indefinite" restart="never" nodeType="tmRoot"/>
+      </p:par>
+    </p:tnLst>
+  </p:timing>
 </p:sld>
 </file>
 
@@ -3986,6 +4007,13 @@
   <p:clrMapOvr>
     <a:masterClrMapping/>
   </p:clrMapOvr>
+  <p:timing>
+    <p:tnLst>
+      <p:par>
+        <p:cTn id="1" dur="indefinite" restart="never" nodeType="tmRoot"/>
+      </p:par>
+    </p:tnLst>
+  </p:timing>
 </p:sld>
 </file>
 
@@ -4125,6 +4153,13 @@
   <p:clrMapOvr>
     <a:masterClrMapping/>
   </p:clrMapOvr>
+  <p:timing>
+    <p:tnLst>
+      <p:par>
+        <p:cTn id="1" dur="indefinite" restart="never" nodeType="tmRoot"/>
+      </p:par>
+    </p:tnLst>
+  </p:timing>
 </p:sld>
 </file>
 
@@ -4336,6 +4371,13 @@
   <p:clrMapOvr>
     <a:masterClrMapping/>
   </p:clrMapOvr>
+  <p:timing>
+    <p:tnLst>
+      <p:par>
+        <p:cTn id="1" dur="indefinite" restart="never" nodeType="tmRoot"/>
+      </p:par>
+    </p:tnLst>
+  </p:timing>
 </p:sld>
 </file>
 
@@ -4520,6 +4562,13 @@
   <p:clrMapOvr>
     <a:masterClrMapping/>
   </p:clrMapOvr>
+  <p:timing>
+    <p:tnLst>
+      <p:par>
+        <p:cTn id="1" dur="indefinite" restart="never" nodeType="tmRoot"/>
+      </p:par>
+    </p:tnLst>
+  </p:timing>
 </p:sld>
 </file>
 
@@ -4816,7 +4865,19 @@
               <a:rPr lang="en-US" sz="2000" dirty="0">
                 <a:latin typeface="Consolas" panose="020B0609020204030204" pitchFamily="49" charset="0"/>
               </a:rPr>
-              <a:t> s0, (&lt;</a:t>
+              <a:t> </a:t>
+            </a:r>
+            <a:r>
+              <a:rPr lang="en-US" sz="2000" dirty="0" smtClean="0">
+                <a:latin typeface="Consolas" panose="020B0609020204030204" pitchFamily="49" charset="0"/>
+              </a:rPr>
+              <a:t>v0</a:t>
+            </a:r>
+            <a:r>
+              <a:rPr lang="en-US" sz="2000" dirty="0">
+                <a:latin typeface="Consolas" panose="020B0609020204030204" pitchFamily="49" charset="0"/>
+              </a:rPr>
+              <a:t>, (&lt;</a:t>
             </a:r>
             <a:r>
               <a:rPr lang="en-US" sz="2000" dirty="0" err="1">
@@ -4843,6 +4904,13 @@
   <p:clrMapOvr>
     <a:masterClrMapping/>
   </p:clrMapOvr>
+  <p:timing>
+    <p:tnLst>
+      <p:par>
+        <p:cTn id="1" dur="indefinite" restart="never" nodeType="tmRoot"/>
+      </p:par>
+    </p:tnLst>
+  </p:timing>
 </p:sld>
 </file>
 

</xml_diff>